<commit_message>
[Update] Change Title Format
</commit_message>
<xml_diff>
--- a/Document/Wireframe.pptx
+++ b/Document/Wireframe.pptx
@@ -267,7 +267,7 @@
           <a:p>
             <a:fld id="{DB2DEBA8-F55D-44A4-AB57-279B0C7BB628}" type="datetimeFigureOut">
               <a:rPr lang="ko-KR" altLang="en-US" smtClean="0"/>
-              <a:t>2024-10-16</a:t>
+              <a:t>2024-10-20</a:t>
             </a:fld>
             <a:endParaRPr lang="ko-KR" altLang="en-US"/>
           </a:p>
@@ -465,7 +465,7 @@
           <a:p>
             <a:fld id="{DB2DEBA8-F55D-44A4-AB57-279B0C7BB628}" type="datetimeFigureOut">
               <a:rPr lang="ko-KR" altLang="en-US" smtClean="0"/>
-              <a:t>2024-10-16</a:t>
+              <a:t>2024-10-20</a:t>
             </a:fld>
             <a:endParaRPr lang="ko-KR" altLang="en-US"/>
           </a:p>
@@ -673,7 +673,7 @@
           <a:p>
             <a:fld id="{DB2DEBA8-F55D-44A4-AB57-279B0C7BB628}" type="datetimeFigureOut">
               <a:rPr lang="ko-KR" altLang="en-US" smtClean="0"/>
-              <a:t>2024-10-16</a:t>
+              <a:t>2024-10-20</a:t>
             </a:fld>
             <a:endParaRPr lang="ko-KR" altLang="en-US"/>
           </a:p>
@@ -871,7 +871,7 @@
           <a:p>
             <a:fld id="{DB2DEBA8-F55D-44A4-AB57-279B0C7BB628}" type="datetimeFigureOut">
               <a:rPr lang="ko-KR" altLang="en-US" smtClean="0"/>
-              <a:t>2024-10-16</a:t>
+              <a:t>2024-10-20</a:t>
             </a:fld>
             <a:endParaRPr lang="ko-KR" altLang="en-US"/>
           </a:p>
@@ -1146,7 +1146,7 @@
           <a:p>
             <a:fld id="{DB2DEBA8-F55D-44A4-AB57-279B0C7BB628}" type="datetimeFigureOut">
               <a:rPr lang="ko-KR" altLang="en-US" smtClean="0"/>
-              <a:t>2024-10-16</a:t>
+              <a:t>2024-10-20</a:t>
             </a:fld>
             <a:endParaRPr lang="ko-KR" altLang="en-US"/>
           </a:p>
@@ -1411,7 +1411,7 @@
           <a:p>
             <a:fld id="{DB2DEBA8-F55D-44A4-AB57-279B0C7BB628}" type="datetimeFigureOut">
               <a:rPr lang="ko-KR" altLang="en-US" smtClean="0"/>
-              <a:t>2024-10-16</a:t>
+              <a:t>2024-10-20</a:t>
             </a:fld>
             <a:endParaRPr lang="ko-KR" altLang="en-US"/>
           </a:p>
@@ -1823,7 +1823,7 @@
           <a:p>
             <a:fld id="{DB2DEBA8-F55D-44A4-AB57-279B0C7BB628}" type="datetimeFigureOut">
               <a:rPr lang="ko-KR" altLang="en-US" smtClean="0"/>
-              <a:t>2024-10-16</a:t>
+              <a:t>2024-10-20</a:t>
             </a:fld>
             <a:endParaRPr lang="ko-KR" altLang="en-US"/>
           </a:p>
@@ -1964,7 +1964,7 @@
           <a:p>
             <a:fld id="{DB2DEBA8-F55D-44A4-AB57-279B0C7BB628}" type="datetimeFigureOut">
               <a:rPr lang="ko-KR" altLang="en-US" smtClean="0"/>
-              <a:t>2024-10-16</a:t>
+              <a:t>2024-10-20</a:t>
             </a:fld>
             <a:endParaRPr lang="ko-KR" altLang="en-US"/>
           </a:p>
@@ -2077,7 +2077,7 @@
           <a:p>
             <a:fld id="{DB2DEBA8-F55D-44A4-AB57-279B0C7BB628}" type="datetimeFigureOut">
               <a:rPr lang="ko-KR" altLang="en-US" smtClean="0"/>
-              <a:t>2024-10-16</a:t>
+              <a:t>2024-10-20</a:t>
             </a:fld>
             <a:endParaRPr lang="ko-KR" altLang="en-US"/>
           </a:p>
@@ -2388,7 +2388,7 @@
           <a:p>
             <a:fld id="{DB2DEBA8-F55D-44A4-AB57-279B0C7BB628}" type="datetimeFigureOut">
               <a:rPr lang="ko-KR" altLang="en-US" smtClean="0"/>
-              <a:t>2024-10-16</a:t>
+              <a:t>2024-10-20</a:t>
             </a:fld>
             <a:endParaRPr lang="ko-KR" altLang="en-US"/>
           </a:p>
@@ -2676,7 +2676,7 @@
           <a:p>
             <a:fld id="{DB2DEBA8-F55D-44A4-AB57-279B0C7BB628}" type="datetimeFigureOut">
               <a:rPr lang="ko-KR" altLang="en-US" smtClean="0"/>
-              <a:t>2024-10-16</a:t>
+              <a:t>2024-10-20</a:t>
             </a:fld>
             <a:endParaRPr lang="ko-KR" altLang="en-US"/>
           </a:p>
@@ -2917,7 +2917,7 @@
           <a:p>
             <a:fld id="{DB2DEBA8-F55D-44A4-AB57-279B0C7BB628}" type="datetimeFigureOut">
               <a:rPr lang="ko-KR" altLang="en-US" smtClean="0"/>
-              <a:t>2024-10-16</a:t>
+              <a:t>2024-10-20</a:t>
             </a:fld>
             <a:endParaRPr lang="ko-KR" altLang="en-US"/>
           </a:p>
@@ -3348,7 +3348,7 @@
         </p:nvSpPr>
         <p:spPr>
           <a:xfrm>
-            <a:off x="7419703" y="357051"/>
+            <a:off x="1063228" y="323221"/>
             <a:ext cx="3877985" cy="1200329"/>
           </a:xfrm>
           <a:prstGeom prst="rect">
@@ -3383,8 +3383,8 @@
         </p:nvSpPr>
         <p:spPr>
           <a:xfrm>
-            <a:off x="4772298" y="1445622"/>
-            <a:ext cx="6497291" cy="1754326"/>
+            <a:off x="2394858" y="1445622"/>
+            <a:ext cx="2954655" cy="1754326"/>
           </a:xfrm>
           <a:prstGeom prst="rect">
             <a:avLst/>
@@ -3401,18 +3401,6 @@
               <a:rPr lang="ko-KR" altLang="en-US" sz="10800" dirty="0"/>
               <a:t>우당</a:t>
             </a:r>
-            <a:r>
-              <a:rPr lang="en-US" altLang="ko-KR" sz="10800" b="1" dirty="0"/>
-              <a:t>’</a:t>
-            </a:r>
-            <a:r>
-              <a:rPr lang="ko-KR" altLang="en-US" sz="10800" b="1" dirty="0"/>
-              <a:t>탕탕</a:t>
-            </a:r>
-            <a:r>
-              <a:rPr lang="en-US" altLang="ko-KR" sz="10800" b="1" dirty="0"/>
-              <a:t>’</a:t>
-            </a:r>
             <a:endParaRPr lang="ko-KR" altLang="en-US" sz="10800" b="1" dirty="0"/>
           </a:p>
         </p:txBody>
@@ -3431,7 +3419,7 @@
         </p:nvSpPr>
         <p:spPr>
           <a:xfrm>
-            <a:off x="6553200" y="3473841"/>
+            <a:off x="7523799" y="3473841"/>
             <a:ext cx="1415772" cy="461665"/>
           </a:xfrm>
           <a:prstGeom prst="rect">
@@ -3466,7 +3454,7 @@
         </p:nvSpPr>
         <p:spPr>
           <a:xfrm>
-            <a:off x="9695464" y="3473841"/>
+            <a:off x="9903298" y="3473841"/>
             <a:ext cx="1415772" cy="461665"/>
           </a:xfrm>
           <a:prstGeom prst="rect">
@@ -3501,7 +3489,7 @@
         </p:nvGrpSpPr>
         <p:grpSpPr>
           <a:xfrm>
-            <a:off x="6035637" y="3473842"/>
+            <a:off x="7006236" y="3473842"/>
             <a:ext cx="517563" cy="492160"/>
             <a:chOff x="5332521" y="3473841"/>
             <a:chExt cx="679692" cy="646331"/>
@@ -3635,7 +3623,7 @@
         </p:nvGrpSpPr>
         <p:grpSpPr>
           <a:xfrm>
-            <a:off x="9177900" y="3473841"/>
+            <a:off x="9385734" y="3473841"/>
             <a:ext cx="517564" cy="492161"/>
             <a:chOff x="8558572" y="3473841"/>
             <a:chExt cx="679692" cy="646331"/>
@@ -4478,6 +4466,104 @@
           <a:p>
             <a:pPr algn="ctr"/>
             <a:endParaRPr lang="ko-KR" altLang="en-US"/>
+          </a:p>
+        </p:txBody>
+      </p:sp>
+      <p:sp>
+        <p:nvSpPr>
+          <p:cNvPr id="16" name="TextBox 15">
+            <a:extLst>
+              <a:ext uri="{FF2B5EF4-FFF2-40B4-BE49-F238E27FC236}">
+                <a16:creationId xmlns:a16="http://schemas.microsoft.com/office/drawing/2014/main" id="{DB264988-C25B-A5ED-109B-3911838D5C32}"/>
+              </a:ext>
+            </a:extLst>
+          </p:cNvPr>
+          <p:cNvSpPr txBox="1"/>
+          <p:nvPr/>
+        </p:nvSpPr>
+        <p:spPr>
+          <a:xfrm>
+            <a:off x="5201883" y="581170"/>
+            <a:ext cx="4801314" cy="2862322"/>
+          </a:xfrm>
+          <a:prstGeom prst="rect">
+            <a:avLst/>
+          </a:prstGeom>
+          <a:noFill/>
+        </p:spPr>
+        <p:txBody>
+          <a:bodyPr wrap="none" rtlCol="0">
+            <a:spAutoFit/>
+          </a:bodyPr>
+          <a:lstStyle/>
+          <a:p>
+            <a:r>
+              <a:rPr lang="ko-KR" altLang="en-US" sz="18000" b="1" dirty="0"/>
+              <a:t>탕탕</a:t>
+            </a:r>
+          </a:p>
+        </p:txBody>
+      </p:sp>
+      <p:sp>
+        <p:nvSpPr>
+          <p:cNvPr id="17" name="직사각형 16">
+            <a:extLst>
+              <a:ext uri="{FF2B5EF4-FFF2-40B4-BE49-F238E27FC236}">
+                <a16:creationId xmlns:a16="http://schemas.microsoft.com/office/drawing/2014/main" id="{CE861046-222B-9110-04E6-C84BCEA92F3F}"/>
+              </a:ext>
+            </a:extLst>
+          </p:cNvPr>
+          <p:cNvSpPr/>
+          <p:nvPr/>
+        </p:nvSpPr>
+        <p:spPr>
+          <a:xfrm>
+            <a:off x="548640" y="4122887"/>
+            <a:ext cx="8315243" cy="2512623"/>
+          </a:xfrm>
+          <a:prstGeom prst="rect">
+            <a:avLst/>
+          </a:prstGeom>
+          <a:solidFill>
+            <a:schemeClr val="bg1">
+              <a:lumMod val="75000"/>
+            </a:schemeClr>
+          </a:solidFill>
+          <a:ln>
+            <a:solidFill>
+              <a:schemeClr val="tx1"/>
+            </a:solidFill>
+          </a:ln>
+        </p:spPr>
+        <p:style>
+          <a:lnRef idx="2">
+            <a:schemeClr val="accent1">
+              <a:shade val="15000"/>
+            </a:schemeClr>
+          </a:lnRef>
+          <a:fillRef idx="1">
+            <a:schemeClr val="accent1"/>
+          </a:fillRef>
+          <a:effectRef idx="0">
+            <a:schemeClr val="accent1"/>
+          </a:effectRef>
+          <a:fontRef idx="minor">
+            <a:schemeClr val="lt1"/>
+          </a:fontRef>
+        </p:style>
+        <p:txBody>
+          <a:bodyPr rtlCol="0" anchor="ctr"/>
+          <a:lstStyle/>
+          <a:p>
+            <a:pPr algn="ctr"/>
+            <a:r>
+              <a:rPr lang="ko-KR" altLang="en-US" sz="3200">
+                <a:solidFill>
+                  <a:schemeClr val="tx1"/>
+                </a:solidFill>
+              </a:rPr>
+              <a:t>리더보드</a:t>
+            </a:r>
           </a:p>
         </p:txBody>
       </p:sp>

</xml_diff>

<commit_message>
[Update] Add Leaderboard in Wireframe
</commit_message>
<xml_diff>
--- a/Document/Wireframe.pptx
+++ b/Document/Wireframe.pptx
@@ -267,7 +267,7 @@
           <a:p>
             <a:fld id="{DB2DEBA8-F55D-44A4-AB57-279B0C7BB628}" type="datetimeFigureOut">
               <a:rPr lang="ko-KR" altLang="en-US" smtClean="0"/>
-              <a:t>2024-10-20</a:t>
+              <a:t>2024-10-21</a:t>
             </a:fld>
             <a:endParaRPr lang="ko-KR" altLang="en-US"/>
           </a:p>
@@ -465,7 +465,7 @@
           <a:p>
             <a:fld id="{DB2DEBA8-F55D-44A4-AB57-279B0C7BB628}" type="datetimeFigureOut">
               <a:rPr lang="ko-KR" altLang="en-US" smtClean="0"/>
-              <a:t>2024-10-20</a:t>
+              <a:t>2024-10-21</a:t>
             </a:fld>
             <a:endParaRPr lang="ko-KR" altLang="en-US"/>
           </a:p>
@@ -673,7 +673,7 @@
           <a:p>
             <a:fld id="{DB2DEBA8-F55D-44A4-AB57-279B0C7BB628}" type="datetimeFigureOut">
               <a:rPr lang="ko-KR" altLang="en-US" smtClean="0"/>
-              <a:t>2024-10-20</a:t>
+              <a:t>2024-10-21</a:t>
             </a:fld>
             <a:endParaRPr lang="ko-KR" altLang="en-US"/>
           </a:p>
@@ -871,7 +871,7 @@
           <a:p>
             <a:fld id="{DB2DEBA8-F55D-44A4-AB57-279B0C7BB628}" type="datetimeFigureOut">
               <a:rPr lang="ko-KR" altLang="en-US" smtClean="0"/>
-              <a:t>2024-10-20</a:t>
+              <a:t>2024-10-21</a:t>
             </a:fld>
             <a:endParaRPr lang="ko-KR" altLang="en-US"/>
           </a:p>
@@ -1146,7 +1146,7 @@
           <a:p>
             <a:fld id="{DB2DEBA8-F55D-44A4-AB57-279B0C7BB628}" type="datetimeFigureOut">
               <a:rPr lang="ko-KR" altLang="en-US" smtClean="0"/>
-              <a:t>2024-10-20</a:t>
+              <a:t>2024-10-21</a:t>
             </a:fld>
             <a:endParaRPr lang="ko-KR" altLang="en-US"/>
           </a:p>
@@ -1411,7 +1411,7 @@
           <a:p>
             <a:fld id="{DB2DEBA8-F55D-44A4-AB57-279B0C7BB628}" type="datetimeFigureOut">
               <a:rPr lang="ko-KR" altLang="en-US" smtClean="0"/>
-              <a:t>2024-10-20</a:t>
+              <a:t>2024-10-21</a:t>
             </a:fld>
             <a:endParaRPr lang="ko-KR" altLang="en-US"/>
           </a:p>
@@ -1823,7 +1823,7 @@
           <a:p>
             <a:fld id="{DB2DEBA8-F55D-44A4-AB57-279B0C7BB628}" type="datetimeFigureOut">
               <a:rPr lang="ko-KR" altLang="en-US" smtClean="0"/>
-              <a:t>2024-10-20</a:t>
+              <a:t>2024-10-21</a:t>
             </a:fld>
             <a:endParaRPr lang="ko-KR" altLang="en-US"/>
           </a:p>
@@ -1964,7 +1964,7 @@
           <a:p>
             <a:fld id="{DB2DEBA8-F55D-44A4-AB57-279B0C7BB628}" type="datetimeFigureOut">
               <a:rPr lang="ko-KR" altLang="en-US" smtClean="0"/>
-              <a:t>2024-10-20</a:t>
+              <a:t>2024-10-21</a:t>
             </a:fld>
             <a:endParaRPr lang="ko-KR" altLang="en-US"/>
           </a:p>
@@ -2077,7 +2077,7 @@
           <a:p>
             <a:fld id="{DB2DEBA8-F55D-44A4-AB57-279B0C7BB628}" type="datetimeFigureOut">
               <a:rPr lang="ko-KR" altLang="en-US" smtClean="0"/>
-              <a:t>2024-10-20</a:t>
+              <a:t>2024-10-21</a:t>
             </a:fld>
             <a:endParaRPr lang="ko-KR" altLang="en-US"/>
           </a:p>
@@ -2388,7 +2388,7 @@
           <a:p>
             <a:fld id="{DB2DEBA8-F55D-44A4-AB57-279B0C7BB628}" type="datetimeFigureOut">
               <a:rPr lang="ko-KR" altLang="en-US" smtClean="0"/>
-              <a:t>2024-10-20</a:t>
+              <a:t>2024-10-21</a:t>
             </a:fld>
             <a:endParaRPr lang="ko-KR" altLang="en-US"/>
           </a:p>
@@ -2676,7 +2676,7 @@
           <a:p>
             <a:fld id="{DB2DEBA8-F55D-44A4-AB57-279B0C7BB628}" type="datetimeFigureOut">
               <a:rPr lang="ko-KR" altLang="en-US" smtClean="0"/>
-              <a:t>2024-10-20</a:t>
+              <a:t>2024-10-21</a:t>
             </a:fld>
             <a:endParaRPr lang="ko-KR" altLang="en-US"/>
           </a:p>
@@ -2917,7 +2917,7 @@
           <a:p>
             <a:fld id="{DB2DEBA8-F55D-44A4-AB57-279B0C7BB628}" type="datetimeFigureOut">
               <a:rPr lang="ko-KR" altLang="en-US" smtClean="0"/>
-              <a:t>2024-10-20</a:t>
+              <a:t>2024-10-21</a:t>
             </a:fld>
             <a:endParaRPr lang="ko-KR" altLang="en-US"/>
           </a:p>
@@ -4506,7 +4506,7 @@
       </p:sp>
       <p:sp>
         <p:nvSpPr>
-          <p:cNvPr id="17" name="직사각형 16">
+          <p:cNvPr id="17" name="사각형: 둥근 모서리 16">
             <a:extLst>
               <a:ext uri="{FF2B5EF4-FFF2-40B4-BE49-F238E27FC236}">
                 <a16:creationId xmlns:a16="http://schemas.microsoft.com/office/drawing/2014/main" id="{CE861046-222B-9110-04E6-C84BCEA92F3F}"/>
@@ -4518,15 +4518,17 @@
         </p:nvSpPr>
         <p:spPr>
           <a:xfrm>
-            <a:off x="548640" y="4122887"/>
-            <a:ext cx="8315243" cy="2512623"/>
-          </a:xfrm>
-          <a:prstGeom prst="rect">
-            <a:avLst/>
+            <a:off x="548641" y="4122887"/>
+            <a:ext cx="7292706" cy="2512623"/>
+          </a:xfrm>
+          <a:prstGeom prst="roundRect">
+            <a:avLst>
+              <a:gd name="adj" fmla="val 4536"/>
+            </a:avLst>
           </a:prstGeom>
           <a:solidFill>
             <a:schemeClr val="bg1">
-              <a:lumMod val="75000"/>
+              <a:lumMod val="85000"/>
             </a:schemeClr>
           </a:solidFill>
           <a:ln>
@@ -4556,17 +4558,1522 @@
           <a:lstStyle/>
           <a:p>
             <a:pPr algn="ctr"/>
+            <a:endParaRPr lang="ko-KR" altLang="en-US" sz="3200" dirty="0">
+              <a:solidFill>
+                <a:schemeClr val="tx1"/>
+              </a:solidFill>
+            </a:endParaRPr>
+          </a:p>
+        </p:txBody>
+      </p:sp>
+      <p:sp>
+        <p:nvSpPr>
+          <p:cNvPr id="30" name="직사각형 29">
+            <a:extLst>
+              <a:ext uri="{FF2B5EF4-FFF2-40B4-BE49-F238E27FC236}">
+                <a16:creationId xmlns:a16="http://schemas.microsoft.com/office/drawing/2014/main" id="{92A63AFE-F02A-72D3-661A-495D3C45C38A}"/>
+              </a:ext>
+            </a:extLst>
+          </p:cNvPr>
+          <p:cNvSpPr/>
+          <p:nvPr/>
+        </p:nvSpPr>
+        <p:spPr>
+          <a:xfrm>
+            <a:off x="758428" y="4322349"/>
+            <a:ext cx="609600" cy="609600"/>
+          </a:xfrm>
+          <a:prstGeom prst="rect">
+            <a:avLst/>
+          </a:prstGeom>
+        </p:spPr>
+        <p:style>
+          <a:lnRef idx="2">
+            <a:schemeClr val="accent1">
+              <a:shade val="15000"/>
+            </a:schemeClr>
+          </a:lnRef>
+          <a:fillRef idx="1">
+            <a:schemeClr val="accent1"/>
+          </a:fillRef>
+          <a:effectRef idx="0">
+            <a:schemeClr val="accent1"/>
+          </a:effectRef>
+          <a:fontRef idx="minor">
+            <a:schemeClr val="lt1"/>
+          </a:fontRef>
+        </p:style>
+        <p:txBody>
+          <a:bodyPr rtlCol="0" anchor="ctr"/>
+          <a:lstStyle/>
+          <a:p>
+            <a:pPr algn="ctr"/>
+            <a:endParaRPr lang="ko-KR" altLang="en-US"/>
+          </a:p>
+        </p:txBody>
+      </p:sp>
+      <p:sp>
+        <p:nvSpPr>
+          <p:cNvPr id="31" name="TextBox 30">
+            <a:extLst>
+              <a:ext uri="{FF2B5EF4-FFF2-40B4-BE49-F238E27FC236}">
+                <a16:creationId xmlns:a16="http://schemas.microsoft.com/office/drawing/2014/main" id="{D3AAFD7F-2113-7991-1D36-38014B20F7CC}"/>
+              </a:ext>
+            </a:extLst>
+          </p:cNvPr>
+          <p:cNvSpPr txBox="1"/>
+          <p:nvPr/>
+        </p:nvSpPr>
+        <p:spPr>
+          <a:xfrm>
+            <a:off x="1460052" y="4536278"/>
+            <a:ext cx="1173719" cy="369332"/>
+          </a:xfrm>
+          <a:prstGeom prst="rect">
+            <a:avLst/>
+          </a:prstGeom>
+          <a:noFill/>
+        </p:spPr>
+        <p:txBody>
+          <a:bodyPr wrap="none" rtlCol="0">
+            <a:spAutoFit/>
+          </a:bodyPr>
+          <a:lstStyle/>
+          <a:p>
             <a:r>
-              <a:rPr lang="ko-KR" altLang="en-US" sz="3200">
+              <a:rPr lang="en-US" altLang="ko-KR" dirty="0"/>
+              <a:t>8,888,888</a:t>
+            </a:r>
+            <a:endParaRPr lang="ko-KR" altLang="en-US" dirty="0"/>
+          </a:p>
+        </p:txBody>
+      </p:sp>
+      <p:sp>
+        <p:nvSpPr>
+          <p:cNvPr id="32" name="TextBox 31">
+            <a:extLst>
+              <a:ext uri="{FF2B5EF4-FFF2-40B4-BE49-F238E27FC236}">
+                <a16:creationId xmlns:a16="http://schemas.microsoft.com/office/drawing/2014/main" id="{C0CFC6E6-F470-BA70-9E65-F139B9B2D8CD}"/>
+              </a:ext>
+            </a:extLst>
+          </p:cNvPr>
+          <p:cNvSpPr txBox="1"/>
+          <p:nvPr/>
+        </p:nvSpPr>
+        <p:spPr>
+          <a:xfrm>
+            <a:off x="569113" y="4122887"/>
+            <a:ext cx="378630" cy="492443"/>
+          </a:xfrm>
+          <a:prstGeom prst="rect">
+            <a:avLst/>
+          </a:prstGeom>
+          <a:noFill/>
+        </p:spPr>
+        <p:txBody>
+          <a:bodyPr wrap="none" rtlCol="0">
+            <a:spAutoFit/>
+          </a:bodyPr>
+          <a:lstStyle/>
+          <a:p>
+            <a:r>
+              <a:rPr lang="en-US" altLang="ko-KR" sz="2600" b="1" dirty="0">
+                <a:ln>
+                  <a:solidFill>
+                    <a:schemeClr val="tx1"/>
+                  </a:solidFill>
+                </a:ln>
+                <a:solidFill>
+                  <a:schemeClr val="bg1"/>
+                </a:solidFill>
+              </a:rPr>
+              <a:t>1</a:t>
+            </a:r>
+            <a:endParaRPr lang="ko-KR" altLang="en-US" sz="2600" b="1" dirty="0">
+              <a:ln>
                 <a:solidFill>
                   <a:schemeClr val="tx1"/>
                 </a:solidFill>
+              </a:ln>
+              <a:solidFill>
+                <a:schemeClr val="bg1"/>
+              </a:solidFill>
+            </a:endParaRPr>
+          </a:p>
+        </p:txBody>
+      </p:sp>
+      <p:cxnSp>
+        <p:nvCxnSpPr>
+          <p:cNvPr id="34" name="직선 연결선 33">
+            <a:extLst>
+              <a:ext uri="{FF2B5EF4-FFF2-40B4-BE49-F238E27FC236}">
+                <a16:creationId xmlns:a16="http://schemas.microsoft.com/office/drawing/2014/main" id="{CEC80C24-1C06-2ADA-1246-08297795717D}"/>
+              </a:ext>
+            </a:extLst>
+          </p:cNvPr>
+          <p:cNvCxnSpPr/>
+          <p:nvPr/>
+        </p:nvCxnSpPr>
+        <p:spPr>
+          <a:xfrm>
+            <a:off x="1472530" y="4905610"/>
+            <a:ext cx="1161241" cy="0"/>
+          </a:xfrm>
+          <a:prstGeom prst="line">
+            <a:avLst/>
+          </a:prstGeom>
+          <a:ln>
+            <a:solidFill>
+              <a:schemeClr val="tx1">
+                <a:lumMod val="65000"/>
+                <a:lumOff val="35000"/>
+              </a:schemeClr>
+            </a:solidFill>
+          </a:ln>
+        </p:spPr>
+        <p:style>
+          <a:lnRef idx="2">
+            <a:schemeClr val="accent1"/>
+          </a:lnRef>
+          <a:fillRef idx="0">
+            <a:schemeClr val="accent1"/>
+          </a:fillRef>
+          <a:effectRef idx="1">
+            <a:schemeClr val="accent1"/>
+          </a:effectRef>
+          <a:fontRef idx="minor">
+            <a:schemeClr val="tx1"/>
+          </a:fontRef>
+        </p:style>
+      </p:cxnSp>
+      <p:sp>
+        <p:nvSpPr>
+          <p:cNvPr id="37" name="직사각형 36">
+            <a:extLst>
+              <a:ext uri="{FF2B5EF4-FFF2-40B4-BE49-F238E27FC236}">
+                <a16:creationId xmlns:a16="http://schemas.microsoft.com/office/drawing/2014/main" id="{4A3A3D65-6C10-B99C-4556-E483E31A2C02}"/>
+              </a:ext>
+            </a:extLst>
+          </p:cNvPr>
+          <p:cNvSpPr/>
+          <p:nvPr/>
+        </p:nvSpPr>
+        <p:spPr>
+          <a:xfrm>
+            <a:off x="758428" y="5114224"/>
+            <a:ext cx="609600" cy="609600"/>
+          </a:xfrm>
+          <a:prstGeom prst="rect">
+            <a:avLst/>
+          </a:prstGeom>
+        </p:spPr>
+        <p:style>
+          <a:lnRef idx="2">
+            <a:schemeClr val="accent1">
+              <a:shade val="15000"/>
+            </a:schemeClr>
+          </a:lnRef>
+          <a:fillRef idx="1">
+            <a:schemeClr val="accent1"/>
+          </a:fillRef>
+          <a:effectRef idx="0">
+            <a:schemeClr val="accent1"/>
+          </a:effectRef>
+          <a:fontRef idx="minor">
+            <a:schemeClr val="lt1"/>
+          </a:fontRef>
+        </p:style>
+        <p:txBody>
+          <a:bodyPr rtlCol="0" anchor="ctr"/>
+          <a:lstStyle/>
+          <a:p>
+            <a:pPr algn="ctr"/>
+            <a:endParaRPr lang="ko-KR" altLang="en-US"/>
+          </a:p>
+        </p:txBody>
+      </p:sp>
+      <p:sp>
+        <p:nvSpPr>
+          <p:cNvPr id="38" name="TextBox 37">
+            <a:extLst>
+              <a:ext uri="{FF2B5EF4-FFF2-40B4-BE49-F238E27FC236}">
+                <a16:creationId xmlns:a16="http://schemas.microsoft.com/office/drawing/2014/main" id="{1FE606F9-4D07-B5C5-5B18-573B0870A6DF}"/>
+              </a:ext>
+            </a:extLst>
+          </p:cNvPr>
+          <p:cNvSpPr txBox="1"/>
+          <p:nvPr/>
+        </p:nvSpPr>
+        <p:spPr>
+          <a:xfrm>
+            <a:off x="1460052" y="5328153"/>
+            <a:ext cx="1173719" cy="369332"/>
+          </a:xfrm>
+          <a:prstGeom prst="rect">
+            <a:avLst/>
+          </a:prstGeom>
+          <a:noFill/>
+        </p:spPr>
+        <p:txBody>
+          <a:bodyPr wrap="none" rtlCol="0">
+            <a:spAutoFit/>
+          </a:bodyPr>
+          <a:lstStyle/>
+          <a:p>
+            <a:r>
+              <a:rPr lang="en-US" altLang="ko-KR" dirty="0"/>
+              <a:t>8,888,888</a:t>
+            </a:r>
+            <a:endParaRPr lang="ko-KR" altLang="en-US" dirty="0"/>
+          </a:p>
+        </p:txBody>
+      </p:sp>
+      <p:sp>
+        <p:nvSpPr>
+          <p:cNvPr id="39" name="TextBox 38">
+            <a:extLst>
+              <a:ext uri="{FF2B5EF4-FFF2-40B4-BE49-F238E27FC236}">
+                <a16:creationId xmlns:a16="http://schemas.microsoft.com/office/drawing/2014/main" id="{41E3E3D1-3C41-D103-EDF8-DF63BB945EA1}"/>
+              </a:ext>
+            </a:extLst>
+          </p:cNvPr>
+          <p:cNvSpPr txBox="1"/>
+          <p:nvPr/>
+        </p:nvSpPr>
+        <p:spPr>
+          <a:xfrm>
+            <a:off x="569113" y="4914762"/>
+            <a:ext cx="378630" cy="492443"/>
+          </a:xfrm>
+          <a:prstGeom prst="rect">
+            <a:avLst/>
+          </a:prstGeom>
+          <a:noFill/>
+        </p:spPr>
+        <p:txBody>
+          <a:bodyPr wrap="none" rtlCol="0">
+            <a:spAutoFit/>
+          </a:bodyPr>
+          <a:lstStyle/>
+          <a:p>
+            <a:r>
+              <a:rPr lang="en-US" altLang="ko-KR" sz="2600" b="1" dirty="0">
+                <a:ln>
+                  <a:solidFill>
+                    <a:schemeClr val="tx1"/>
+                  </a:solidFill>
+                </a:ln>
+                <a:solidFill>
+                  <a:schemeClr val="bg1"/>
+                </a:solidFill>
               </a:rPr>
-              <a:t>리더보드</a:t>
+              <a:t>2</a:t>
             </a:r>
-          </a:p>
-        </p:txBody>
-      </p:sp>
+            <a:endParaRPr lang="ko-KR" altLang="en-US" sz="2600" b="1" dirty="0">
+              <a:ln>
+                <a:solidFill>
+                  <a:schemeClr val="tx1"/>
+                </a:solidFill>
+              </a:ln>
+              <a:solidFill>
+                <a:schemeClr val="bg1"/>
+              </a:solidFill>
+            </a:endParaRPr>
+          </a:p>
+        </p:txBody>
+      </p:sp>
+      <p:cxnSp>
+        <p:nvCxnSpPr>
+          <p:cNvPr id="40" name="직선 연결선 39">
+            <a:extLst>
+              <a:ext uri="{FF2B5EF4-FFF2-40B4-BE49-F238E27FC236}">
+                <a16:creationId xmlns:a16="http://schemas.microsoft.com/office/drawing/2014/main" id="{4D5319FB-E0AA-A0FF-9D6A-E41D1148A253}"/>
+              </a:ext>
+            </a:extLst>
+          </p:cNvPr>
+          <p:cNvCxnSpPr/>
+          <p:nvPr/>
+        </p:nvCxnSpPr>
+        <p:spPr>
+          <a:xfrm>
+            <a:off x="1472530" y="5697485"/>
+            <a:ext cx="1161241" cy="0"/>
+          </a:xfrm>
+          <a:prstGeom prst="line">
+            <a:avLst/>
+          </a:prstGeom>
+          <a:ln>
+            <a:solidFill>
+              <a:schemeClr val="tx1">
+                <a:lumMod val="65000"/>
+                <a:lumOff val="35000"/>
+              </a:schemeClr>
+            </a:solidFill>
+          </a:ln>
+        </p:spPr>
+        <p:style>
+          <a:lnRef idx="2">
+            <a:schemeClr val="accent1"/>
+          </a:lnRef>
+          <a:fillRef idx="0">
+            <a:schemeClr val="accent1"/>
+          </a:fillRef>
+          <a:effectRef idx="1">
+            <a:schemeClr val="accent1"/>
+          </a:effectRef>
+          <a:fontRef idx="minor">
+            <a:schemeClr val="tx1"/>
+          </a:fontRef>
+        </p:style>
+      </p:cxnSp>
+      <p:sp>
+        <p:nvSpPr>
+          <p:cNvPr id="42" name="직사각형 41">
+            <a:extLst>
+              <a:ext uri="{FF2B5EF4-FFF2-40B4-BE49-F238E27FC236}">
+                <a16:creationId xmlns:a16="http://schemas.microsoft.com/office/drawing/2014/main" id="{EE8025F3-8D7D-5492-A801-E6FC14165610}"/>
+              </a:ext>
+            </a:extLst>
+          </p:cNvPr>
+          <p:cNvSpPr/>
+          <p:nvPr/>
+        </p:nvSpPr>
+        <p:spPr>
+          <a:xfrm>
+            <a:off x="758428" y="5883546"/>
+            <a:ext cx="609600" cy="609600"/>
+          </a:xfrm>
+          <a:prstGeom prst="rect">
+            <a:avLst/>
+          </a:prstGeom>
+        </p:spPr>
+        <p:style>
+          <a:lnRef idx="2">
+            <a:schemeClr val="accent1">
+              <a:shade val="15000"/>
+            </a:schemeClr>
+          </a:lnRef>
+          <a:fillRef idx="1">
+            <a:schemeClr val="accent1"/>
+          </a:fillRef>
+          <a:effectRef idx="0">
+            <a:schemeClr val="accent1"/>
+          </a:effectRef>
+          <a:fontRef idx="minor">
+            <a:schemeClr val="lt1"/>
+          </a:fontRef>
+        </p:style>
+        <p:txBody>
+          <a:bodyPr rtlCol="0" anchor="ctr"/>
+          <a:lstStyle/>
+          <a:p>
+            <a:pPr algn="ctr"/>
+            <a:endParaRPr lang="ko-KR" altLang="en-US"/>
+          </a:p>
+        </p:txBody>
+      </p:sp>
+      <p:sp>
+        <p:nvSpPr>
+          <p:cNvPr id="43" name="TextBox 42">
+            <a:extLst>
+              <a:ext uri="{FF2B5EF4-FFF2-40B4-BE49-F238E27FC236}">
+                <a16:creationId xmlns:a16="http://schemas.microsoft.com/office/drawing/2014/main" id="{93BE101E-234E-BD98-71CF-F6E64F527A2E}"/>
+              </a:ext>
+            </a:extLst>
+          </p:cNvPr>
+          <p:cNvSpPr txBox="1"/>
+          <p:nvPr/>
+        </p:nvSpPr>
+        <p:spPr>
+          <a:xfrm>
+            <a:off x="1460052" y="6097475"/>
+            <a:ext cx="1173719" cy="369332"/>
+          </a:xfrm>
+          <a:prstGeom prst="rect">
+            <a:avLst/>
+          </a:prstGeom>
+          <a:noFill/>
+        </p:spPr>
+        <p:txBody>
+          <a:bodyPr wrap="none" rtlCol="0">
+            <a:spAutoFit/>
+          </a:bodyPr>
+          <a:lstStyle/>
+          <a:p>
+            <a:r>
+              <a:rPr lang="en-US" altLang="ko-KR" dirty="0"/>
+              <a:t>8,888,888</a:t>
+            </a:r>
+            <a:endParaRPr lang="ko-KR" altLang="en-US" dirty="0"/>
+          </a:p>
+        </p:txBody>
+      </p:sp>
+      <p:sp>
+        <p:nvSpPr>
+          <p:cNvPr id="44" name="TextBox 43">
+            <a:extLst>
+              <a:ext uri="{FF2B5EF4-FFF2-40B4-BE49-F238E27FC236}">
+                <a16:creationId xmlns:a16="http://schemas.microsoft.com/office/drawing/2014/main" id="{FE4CA78E-89CB-9042-D654-8A412E66F64D}"/>
+              </a:ext>
+            </a:extLst>
+          </p:cNvPr>
+          <p:cNvSpPr txBox="1"/>
+          <p:nvPr/>
+        </p:nvSpPr>
+        <p:spPr>
+          <a:xfrm>
+            <a:off x="569113" y="5684084"/>
+            <a:ext cx="378630" cy="492443"/>
+          </a:xfrm>
+          <a:prstGeom prst="rect">
+            <a:avLst/>
+          </a:prstGeom>
+          <a:noFill/>
+        </p:spPr>
+        <p:txBody>
+          <a:bodyPr wrap="none" rtlCol="0">
+            <a:spAutoFit/>
+          </a:bodyPr>
+          <a:lstStyle/>
+          <a:p>
+            <a:r>
+              <a:rPr lang="en-US" altLang="ko-KR" sz="2600" b="1" dirty="0">
+                <a:ln>
+                  <a:solidFill>
+                    <a:schemeClr val="tx1"/>
+                  </a:solidFill>
+                </a:ln>
+                <a:solidFill>
+                  <a:schemeClr val="bg1"/>
+                </a:solidFill>
+              </a:rPr>
+              <a:t>3</a:t>
+            </a:r>
+            <a:endParaRPr lang="ko-KR" altLang="en-US" sz="2600" b="1" dirty="0">
+              <a:ln>
+                <a:solidFill>
+                  <a:schemeClr val="tx1"/>
+                </a:solidFill>
+              </a:ln>
+              <a:solidFill>
+                <a:schemeClr val="bg1"/>
+              </a:solidFill>
+            </a:endParaRPr>
+          </a:p>
+        </p:txBody>
+      </p:sp>
+      <p:cxnSp>
+        <p:nvCxnSpPr>
+          <p:cNvPr id="45" name="직선 연결선 44">
+            <a:extLst>
+              <a:ext uri="{FF2B5EF4-FFF2-40B4-BE49-F238E27FC236}">
+                <a16:creationId xmlns:a16="http://schemas.microsoft.com/office/drawing/2014/main" id="{4A457678-83D9-0E1A-8B1C-48683A874B13}"/>
+              </a:ext>
+            </a:extLst>
+          </p:cNvPr>
+          <p:cNvCxnSpPr/>
+          <p:nvPr/>
+        </p:nvCxnSpPr>
+        <p:spPr>
+          <a:xfrm>
+            <a:off x="1472530" y="6466807"/>
+            <a:ext cx="1161241" cy="0"/>
+          </a:xfrm>
+          <a:prstGeom prst="line">
+            <a:avLst/>
+          </a:prstGeom>
+          <a:ln>
+            <a:solidFill>
+              <a:schemeClr val="tx1">
+                <a:lumMod val="65000"/>
+                <a:lumOff val="35000"/>
+              </a:schemeClr>
+            </a:solidFill>
+          </a:ln>
+        </p:spPr>
+        <p:style>
+          <a:lnRef idx="2">
+            <a:schemeClr val="accent1"/>
+          </a:lnRef>
+          <a:fillRef idx="0">
+            <a:schemeClr val="accent1"/>
+          </a:fillRef>
+          <a:effectRef idx="1">
+            <a:schemeClr val="accent1"/>
+          </a:effectRef>
+          <a:fontRef idx="minor">
+            <a:schemeClr val="tx1"/>
+          </a:fontRef>
+        </p:style>
+      </p:cxnSp>
+      <p:sp>
+        <p:nvSpPr>
+          <p:cNvPr id="47" name="직사각형 46">
+            <a:extLst>
+              <a:ext uri="{FF2B5EF4-FFF2-40B4-BE49-F238E27FC236}">
+                <a16:creationId xmlns:a16="http://schemas.microsoft.com/office/drawing/2014/main" id="{B4C6B375-3A74-6251-2B0D-DB3D79E2CD33}"/>
+              </a:ext>
+            </a:extLst>
+          </p:cNvPr>
+          <p:cNvSpPr/>
+          <p:nvPr/>
+        </p:nvSpPr>
+        <p:spPr>
+          <a:xfrm>
+            <a:off x="3530161" y="4322349"/>
+            <a:ext cx="609600" cy="609600"/>
+          </a:xfrm>
+          <a:prstGeom prst="rect">
+            <a:avLst/>
+          </a:prstGeom>
+        </p:spPr>
+        <p:style>
+          <a:lnRef idx="2">
+            <a:schemeClr val="accent1">
+              <a:shade val="15000"/>
+            </a:schemeClr>
+          </a:lnRef>
+          <a:fillRef idx="1">
+            <a:schemeClr val="accent1"/>
+          </a:fillRef>
+          <a:effectRef idx="0">
+            <a:schemeClr val="accent1"/>
+          </a:effectRef>
+          <a:fontRef idx="minor">
+            <a:schemeClr val="lt1"/>
+          </a:fontRef>
+        </p:style>
+        <p:txBody>
+          <a:bodyPr rtlCol="0" anchor="ctr"/>
+          <a:lstStyle/>
+          <a:p>
+            <a:pPr algn="ctr"/>
+            <a:endParaRPr lang="ko-KR" altLang="en-US"/>
+          </a:p>
+        </p:txBody>
+      </p:sp>
+      <p:sp>
+        <p:nvSpPr>
+          <p:cNvPr id="48" name="TextBox 47">
+            <a:extLst>
+              <a:ext uri="{FF2B5EF4-FFF2-40B4-BE49-F238E27FC236}">
+                <a16:creationId xmlns:a16="http://schemas.microsoft.com/office/drawing/2014/main" id="{50F182A2-1042-E5E2-A92E-0D32A9D8A3E3}"/>
+              </a:ext>
+            </a:extLst>
+          </p:cNvPr>
+          <p:cNvSpPr txBox="1"/>
+          <p:nvPr/>
+        </p:nvSpPr>
+        <p:spPr>
+          <a:xfrm>
+            <a:off x="4231785" y="4253955"/>
+            <a:ext cx="1173719" cy="369332"/>
+          </a:xfrm>
+          <a:prstGeom prst="rect">
+            <a:avLst/>
+          </a:prstGeom>
+          <a:noFill/>
+        </p:spPr>
+        <p:txBody>
+          <a:bodyPr wrap="none" rtlCol="0">
+            <a:spAutoFit/>
+          </a:bodyPr>
+          <a:lstStyle/>
+          <a:p>
+            <a:r>
+              <a:rPr lang="en-US" altLang="ko-KR" dirty="0"/>
+              <a:t>8,888,888</a:t>
+            </a:r>
+            <a:endParaRPr lang="ko-KR" altLang="en-US" dirty="0"/>
+          </a:p>
+        </p:txBody>
+      </p:sp>
+      <p:sp>
+        <p:nvSpPr>
+          <p:cNvPr id="49" name="TextBox 48">
+            <a:extLst>
+              <a:ext uri="{FF2B5EF4-FFF2-40B4-BE49-F238E27FC236}">
+                <a16:creationId xmlns:a16="http://schemas.microsoft.com/office/drawing/2014/main" id="{31FA925D-9E34-8EB3-15C5-90E62E7F14A0}"/>
+              </a:ext>
+            </a:extLst>
+          </p:cNvPr>
+          <p:cNvSpPr txBox="1"/>
+          <p:nvPr/>
+        </p:nvSpPr>
+        <p:spPr>
+          <a:xfrm>
+            <a:off x="3340846" y="4122887"/>
+            <a:ext cx="378630" cy="492443"/>
+          </a:xfrm>
+          <a:prstGeom prst="rect">
+            <a:avLst/>
+          </a:prstGeom>
+          <a:noFill/>
+        </p:spPr>
+        <p:txBody>
+          <a:bodyPr wrap="none" rtlCol="0">
+            <a:spAutoFit/>
+          </a:bodyPr>
+          <a:lstStyle/>
+          <a:p>
+            <a:r>
+              <a:rPr lang="en-US" altLang="ko-KR" sz="2600" b="1" dirty="0">
+                <a:ln>
+                  <a:solidFill>
+                    <a:schemeClr val="tx1"/>
+                  </a:solidFill>
+                </a:ln>
+                <a:solidFill>
+                  <a:schemeClr val="bg1"/>
+                </a:solidFill>
+              </a:rPr>
+              <a:t>1</a:t>
+            </a:r>
+            <a:endParaRPr lang="ko-KR" altLang="en-US" sz="2600" b="1" dirty="0">
+              <a:ln>
+                <a:solidFill>
+                  <a:schemeClr val="tx1"/>
+                </a:solidFill>
+              </a:ln>
+              <a:solidFill>
+                <a:schemeClr val="bg1"/>
+              </a:solidFill>
+            </a:endParaRPr>
+          </a:p>
+        </p:txBody>
+      </p:sp>
+      <p:cxnSp>
+        <p:nvCxnSpPr>
+          <p:cNvPr id="50" name="직선 연결선 49">
+            <a:extLst>
+              <a:ext uri="{FF2B5EF4-FFF2-40B4-BE49-F238E27FC236}">
+                <a16:creationId xmlns:a16="http://schemas.microsoft.com/office/drawing/2014/main" id="{EB95C5C7-3195-10C7-EB41-45130C5D06F4}"/>
+              </a:ext>
+            </a:extLst>
+          </p:cNvPr>
+          <p:cNvCxnSpPr/>
+          <p:nvPr/>
+        </p:nvCxnSpPr>
+        <p:spPr>
+          <a:xfrm>
+            <a:off x="4244263" y="4623287"/>
+            <a:ext cx="1161241" cy="0"/>
+          </a:xfrm>
+          <a:prstGeom prst="line">
+            <a:avLst/>
+          </a:prstGeom>
+          <a:ln>
+            <a:solidFill>
+              <a:schemeClr val="tx1">
+                <a:lumMod val="65000"/>
+                <a:lumOff val="35000"/>
+              </a:schemeClr>
+            </a:solidFill>
+          </a:ln>
+        </p:spPr>
+        <p:style>
+          <a:lnRef idx="2">
+            <a:schemeClr val="accent1"/>
+          </a:lnRef>
+          <a:fillRef idx="0">
+            <a:schemeClr val="accent1"/>
+          </a:fillRef>
+          <a:effectRef idx="1">
+            <a:schemeClr val="accent1"/>
+          </a:effectRef>
+          <a:fontRef idx="minor">
+            <a:schemeClr val="tx1"/>
+          </a:fontRef>
+        </p:style>
+      </p:cxnSp>
+      <p:sp>
+        <p:nvSpPr>
+          <p:cNvPr id="52" name="직사각형 51">
+            <a:extLst>
+              <a:ext uri="{FF2B5EF4-FFF2-40B4-BE49-F238E27FC236}">
+                <a16:creationId xmlns:a16="http://schemas.microsoft.com/office/drawing/2014/main" id="{CC4D8547-CD4F-571D-DD0D-196B572B0EF3}"/>
+              </a:ext>
+            </a:extLst>
+          </p:cNvPr>
+          <p:cNvSpPr/>
+          <p:nvPr/>
+        </p:nvSpPr>
+        <p:spPr>
+          <a:xfrm>
+            <a:off x="3530161" y="5114224"/>
+            <a:ext cx="609600" cy="609600"/>
+          </a:xfrm>
+          <a:prstGeom prst="rect">
+            <a:avLst/>
+          </a:prstGeom>
+        </p:spPr>
+        <p:style>
+          <a:lnRef idx="2">
+            <a:schemeClr val="accent1">
+              <a:shade val="15000"/>
+            </a:schemeClr>
+          </a:lnRef>
+          <a:fillRef idx="1">
+            <a:schemeClr val="accent1"/>
+          </a:fillRef>
+          <a:effectRef idx="0">
+            <a:schemeClr val="accent1"/>
+          </a:effectRef>
+          <a:fontRef idx="minor">
+            <a:schemeClr val="lt1"/>
+          </a:fontRef>
+        </p:style>
+        <p:txBody>
+          <a:bodyPr rtlCol="0" anchor="ctr"/>
+          <a:lstStyle/>
+          <a:p>
+            <a:pPr algn="ctr"/>
+            <a:endParaRPr lang="ko-KR" altLang="en-US"/>
+          </a:p>
+        </p:txBody>
+      </p:sp>
+      <p:sp>
+        <p:nvSpPr>
+          <p:cNvPr id="53" name="TextBox 52">
+            <a:extLst>
+              <a:ext uri="{FF2B5EF4-FFF2-40B4-BE49-F238E27FC236}">
+                <a16:creationId xmlns:a16="http://schemas.microsoft.com/office/drawing/2014/main" id="{43FF2FCE-14A4-4C75-1566-A553158BF163}"/>
+              </a:ext>
+            </a:extLst>
+          </p:cNvPr>
+          <p:cNvSpPr txBox="1"/>
+          <p:nvPr/>
+        </p:nvSpPr>
+        <p:spPr>
+          <a:xfrm>
+            <a:off x="4231785" y="5045830"/>
+            <a:ext cx="1173719" cy="369332"/>
+          </a:xfrm>
+          <a:prstGeom prst="rect">
+            <a:avLst/>
+          </a:prstGeom>
+          <a:noFill/>
+        </p:spPr>
+        <p:txBody>
+          <a:bodyPr wrap="none" rtlCol="0">
+            <a:spAutoFit/>
+          </a:bodyPr>
+          <a:lstStyle/>
+          <a:p>
+            <a:r>
+              <a:rPr lang="en-US" altLang="ko-KR" dirty="0"/>
+              <a:t>8,888,888</a:t>
+            </a:r>
+            <a:endParaRPr lang="ko-KR" altLang="en-US" dirty="0"/>
+          </a:p>
+        </p:txBody>
+      </p:sp>
+      <p:sp>
+        <p:nvSpPr>
+          <p:cNvPr id="54" name="TextBox 53">
+            <a:extLst>
+              <a:ext uri="{FF2B5EF4-FFF2-40B4-BE49-F238E27FC236}">
+                <a16:creationId xmlns:a16="http://schemas.microsoft.com/office/drawing/2014/main" id="{AB2E7785-7C69-6398-0AF8-381DDAE7CBBD}"/>
+              </a:ext>
+            </a:extLst>
+          </p:cNvPr>
+          <p:cNvSpPr txBox="1"/>
+          <p:nvPr/>
+        </p:nvSpPr>
+        <p:spPr>
+          <a:xfrm>
+            <a:off x="3340846" y="4914762"/>
+            <a:ext cx="378630" cy="492443"/>
+          </a:xfrm>
+          <a:prstGeom prst="rect">
+            <a:avLst/>
+          </a:prstGeom>
+          <a:noFill/>
+        </p:spPr>
+        <p:txBody>
+          <a:bodyPr wrap="none" rtlCol="0">
+            <a:spAutoFit/>
+          </a:bodyPr>
+          <a:lstStyle/>
+          <a:p>
+            <a:r>
+              <a:rPr lang="en-US" altLang="ko-KR" sz="2600" b="1" dirty="0">
+                <a:ln>
+                  <a:solidFill>
+                    <a:schemeClr val="tx1"/>
+                  </a:solidFill>
+                </a:ln>
+                <a:solidFill>
+                  <a:schemeClr val="bg1"/>
+                </a:solidFill>
+              </a:rPr>
+              <a:t>2</a:t>
+            </a:r>
+            <a:endParaRPr lang="ko-KR" altLang="en-US" sz="2600" b="1" dirty="0">
+              <a:ln>
+                <a:solidFill>
+                  <a:schemeClr val="tx1"/>
+                </a:solidFill>
+              </a:ln>
+              <a:solidFill>
+                <a:schemeClr val="bg1"/>
+              </a:solidFill>
+            </a:endParaRPr>
+          </a:p>
+        </p:txBody>
+      </p:sp>
+      <p:cxnSp>
+        <p:nvCxnSpPr>
+          <p:cNvPr id="55" name="직선 연결선 54">
+            <a:extLst>
+              <a:ext uri="{FF2B5EF4-FFF2-40B4-BE49-F238E27FC236}">
+                <a16:creationId xmlns:a16="http://schemas.microsoft.com/office/drawing/2014/main" id="{8FA6096B-8FB4-E29A-3F8C-D31292D5257D}"/>
+              </a:ext>
+            </a:extLst>
+          </p:cNvPr>
+          <p:cNvCxnSpPr/>
+          <p:nvPr/>
+        </p:nvCxnSpPr>
+        <p:spPr>
+          <a:xfrm>
+            <a:off x="4244263" y="5415162"/>
+            <a:ext cx="1161241" cy="0"/>
+          </a:xfrm>
+          <a:prstGeom prst="line">
+            <a:avLst/>
+          </a:prstGeom>
+          <a:ln>
+            <a:solidFill>
+              <a:schemeClr val="tx1">
+                <a:lumMod val="65000"/>
+                <a:lumOff val="35000"/>
+              </a:schemeClr>
+            </a:solidFill>
+          </a:ln>
+        </p:spPr>
+        <p:style>
+          <a:lnRef idx="2">
+            <a:schemeClr val="accent1"/>
+          </a:lnRef>
+          <a:fillRef idx="0">
+            <a:schemeClr val="accent1"/>
+          </a:fillRef>
+          <a:effectRef idx="1">
+            <a:schemeClr val="accent1"/>
+          </a:effectRef>
+          <a:fontRef idx="minor">
+            <a:schemeClr val="tx1"/>
+          </a:fontRef>
+        </p:style>
+      </p:cxnSp>
+      <p:sp>
+        <p:nvSpPr>
+          <p:cNvPr id="57" name="직사각형 56">
+            <a:extLst>
+              <a:ext uri="{FF2B5EF4-FFF2-40B4-BE49-F238E27FC236}">
+                <a16:creationId xmlns:a16="http://schemas.microsoft.com/office/drawing/2014/main" id="{FBD00B66-B8CE-FEF0-0DF2-FFEF7ED2D699}"/>
+              </a:ext>
+            </a:extLst>
+          </p:cNvPr>
+          <p:cNvSpPr/>
+          <p:nvPr/>
+        </p:nvSpPr>
+        <p:spPr>
+          <a:xfrm>
+            <a:off x="3530161" y="5883546"/>
+            <a:ext cx="609600" cy="609600"/>
+          </a:xfrm>
+          <a:prstGeom prst="rect">
+            <a:avLst/>
+          </a:prstGeom>
+        </p:spPr>
+        <p:style>
+          <a:lnRef idx="2">
+            <a:schemeClr val="accent1">
+              <a:shade val="15000"/>
+            </a:schemeClr>
+          </a:lnRef>
+          <a:fillRef idx="1">
+            <a:schemeClr val="accent1"/>
+          </a:fillRef>
+          <a:effectRef idx="0">
+            <a:schemeClr val="accent1"/>
+          </a:effectRef>
+          <a:fontRef idx="minor">
+            <a:schemeClr val="lt1"/>
+          </a:fontRef>
+        </p:style>
+        <p:txBody>
+          <a:bodyPr rtlCol="0" anchor="ctr"/>
+          <a:lstStyle/>
+          <a:p>
+            <a:pPr algn="ctr"/>
+            <a:endParaRPr lang="ko-KR" altLang="en-US"/>
+          </a:p>
+        </p:txBody>
+      </p:sp>
+      <p:sp>
+        <p:nvSpPr>
+          <p:cNvPr id="58" name="TextBox 57">
+            <a:extLst>
+              <a:ext uri="{FF2B5EF4-FFF2-40B4-BE49-F238E27FC236}">
+                <a16:creationId xmlns:a16="http://schemas.microsoft.com/office/drawing/2014/main" id="{19D9A1B7-83BF-89F8-177F-D82FC81EE1CA}"/>
+              </a:ext>
+            </a:extLst>
+          </p:cNvPr>
+          <p:cNvSpPr txBox="1"/>
+          <p:nvPr/>
+        </p:nvSpPr>
+        <p:spPr>
+          <a:xfrm>
+            <a:off x="4231785" y="5815152"/>
+            <a:ext cx="1173719" cy="369332"/>
+          </a:xfrm>
+          <a:prstGeom prst="rect">
+            <a:avLst/>
+          </a:prstGeom>
+          <a:noFill/>
+        </p:spPr>
+        <p:txBody>
+          <a:bodyPr wrap="none" rtlCol="0">
+            <a:spAutoFit/>
+          </a:bodyPr>
+          <a:lstStyle/>
+          <a:p>
+            <a:r>
+              <a:rPr lang="en-US" altLang="ko-KR" dirty="0"/>
+              <a:t>8,888,888</a:t>
+            </a:r>
+            <a:endParaRPr lang="ko-KR" altLang="en-US" dirty="0"/>
+          </a:p>
+        </p:txBody>
+      </p:sp>
+      <p:sp>
+        <p:nvSpPr>
+          <p:cNvPr id="59" name="TextBox 58">
+            <a:extLst>
+              <a:ext uri="{FF2B5EF4-FFF2-40B4-BE49-F238E27FC236}">
+                <a16:creationId xmlns:a16="http://schemas.microsoft.com/office/drawing/2014/main" id="{65EA1A32-3BE0-A8F0-1DC4-7D67E418ACA2}"/>
+              </a:ext>
+            </a:extLst>
+          </p:cNvPr>
+          <p:cNvSpPr txBox="1"/>
+          <p:nvPr/>
+        </p:nvSpPr>
+        <p:spPr>
+          <a:xfrm>
+            <a:off x="3340846" y="5684084"/>
+            <a:ext cx="378630" cy="492443"/>
+          </a:xfrm>
+          <a:prstGeom prst="rect">
+            <a:avLst/>
+          </a:prstGeom>
+          <a:noFill/>
+        </p:spPr>
+        <p:txBody>
+          <a:bodyPr wrap="none" rtlCol="0">
+            <a:spAutoFit/>
+          </a:bodyPr>
+          <a:lstStyle/>
+          <a:p>
+            <a:r>
+              <a:rPr lang="en-US" altLang="ko-KR" sz="2600" b="1" dirty="0">
+                <a:ln>
+                  <a:solidFill>
+                    <a:schemeClr val="tx1"/>
+                  </a:solidFill>
+                </a:ln>
+                <a:solidFill>
+                  <a:schemeClr val="bg1"/>
+                </a:solidFill>
+              </a:rPr>
+              <a:t>3</a:t>
+            </a:r>
+            <a:endParaRPr lang="ko-KR" altLang="en-US" sz="2600" b="1" dirty="0">
+              <a:ln>
+                <a:solidFill>
+                  <a:schemeClr val="tx1"/>
+                </a:solidFill>
+              </a:ln>
+              <a:solidFill>
+                <a:schemeClr val="bg1"/>
+              </a:solidFill>
+            </a:endParaRPr>
+          </a:p>
+        </p:txBody>
+      </p:sp>
+      <p:cxnSp>
+        <p:nvCxnSpPr>
+          <p:cNvPr id="60" name="직선 연결선 59">
+            <a:extLst>
+              <a:ext uri="{FF2B5EF4-FFF2-40B4-BE49-F238E27FC236}">
+                <a16:creationId xmlns:a16="http://schemas.microsoft.com/office/drawing/2014/main" id="{45FBFEF1-4D47-8073-D03E-1F65E8F27466}"/>
+              </a:ext>
+            </a:extLst>
+          </p:cNvPr>
+          <p:cNvCxnSpPr/>
+          <p:nvPr/>
+        </p:nvCxnSpPr>
+        <p:spPr>
+          <a:xfrm>
+            <a:off x="4244263" y="6184484"/>
+            <a:ext cx="1161241" cy="0"/>
+          </a:xfrm>
+          <a:prstGeom prst="line">
+            <a:avLst/>
+          </a:prstGeom>
+          <a:ln>
+            <a:solidFill>
+              <a:schemeClr val="tx1">
+                <a:lumMod val="65000"/>
+                <a:lumOff val="35000"/>
+              </a:schemeClr>
+            </a:solidFill>
+          </a:ln>
+        </p:spPr>
+        <p:style>
+          <a:lnRef idx="2">
+            <a:schemeClr val="accent1"/>
+          </a:lnRef>
+          <a:fillRef idx="0">
+            <a:schemeClr val="accent1"/>
+          </a:fillRef>
+          <a:effectRef idx="1">
+            <a:schemeClr val="accent1"/>
+          </a:effectRef>
+          <a:fontRef idx="minor">
+            <a:schemeClr val="tx1"/>
+          </a:fontRef>
+        </p:style>
+      </p:cxnSp>
+      <p:cxnSp>
+        <p:nvCxnSpPr>
+          <p:cNvPr id="62" name="직선 연결선 61">
+            <a:extLst>
+              <a:ext uri="{FF2B5EF4-FFF2-40B4-BE49-F238E27FC236}">
+                <a16:creationId xmlns:a16="http://schemas.microsoft.com/office/drawing/2014/main" id="{993745F3-3D96-0EAE-1B06-D46757327A8E}"/>
+              </a:ext>
+            </a:extLst>
+          </p:cNvPr>
+          <p:cNvCxnSpPr/>
+          <p:nvPr/>
+        </p:nvCxnSpPr>
+        <p:spPr>
+          <a:xfrm>
+            <a:off x="3126377" y="4322349"/>
+            <a:ext cx="0" cy="2186343"/>
+          </a:xfrm>
+          <a:prstGeom prst="line">
+            <a:avLst/>
+          </a:prstGeom>
+          <a:ln w="38100">
+            <a:solidFill>
+              <a:schemeClr val="tx1">
+                <a:lumMod val="65000"/>
+                <a:lumOff val="35000"/>
+              </a:schemeClr>
+            </a:solidFill>
+          </a:ln>
+        </p:spPr>
+        <p:style>
+          <a:lnRef idx="2">
+            <a:schemeClr val="accent1"/>
+          </a:lnRef>
+          <a:fillRef idx="0">
+            <a:schemeClr val="accent1"/>
+          </a:fillRef>
+          <a:effectRef idx="1">
+            <a:schemeClr val="accent1"/>
+          </a:effectRef>
+          <a:fontRef idx="minor">
+            <a:schemeClr val="tx1"/>
+          </a:fontRef>
+        </p:style>
+      </p:cxnSp>
+      <p:sp>
+        <p:nvSpPr>
+          <p:cNvPr id="64" name="직사각형 63">
+            <a:extLst>
+              <a:ext uri="{FF2B5EF4-FFF2-40B4-BE49-F238E27FC236}">
+                <a16:creationId xmlns:a16="http://schemas.microsoft.com/office/drawing/2014/main" id="{6AFE618A-9886-AB51-1798-0222A4747EDE}"/>
+              </a:ext>
+            </a:extLst>
+          </p:cNvPr>
+          <p:cNvSpPr/>
+          <p:nvPr/>
+        </p:nvSpPr>
+        <p:spPr>
+          <a:xfrm>
+            <a:off x="6975595" y="4322349"/>
+            <a:ext cx="609600" cy="609600"/>
+          </a:xfrm>
+          <a:prstGeom prst="rect">
+            <a:avLst/>
+          </a:prstGeom>
+        </p:spPr>
+        <p:style>
+          <a:lnRef idx="2">
+            <a:schemeClr val="accent1">
+              <a:shade val="15000"/>
+            </a:schemeClr>
+          </a:lnRef>
+          <a:fillRef idx="1">
+            <a:schemeClr val="accent1"/>
+          </a:fillRef>
+          <a:effectRef idx="0">
+            <a:schemeClr val="accent1"/>
+          </a:effectRef>
+          <a:fontRef idx="minor">
+            <a:schemeClr val="lt1"/>
+          </a:fontRef>
+        </p:style>
+        <p:txBody>
+          <a:bodyPr rtlCol="0" anchor="ctr"/>
+          <a:lstStyle/>
+          <a:p>
+            <a:pPr algn="ctr"/>
+            <a:endParaRPr lang="ko-KR" altLang="en-US"/>
+          </a:p>
+        </p:txBody>
+      </p:sp>
+      <p:sp>
+        <p:nvSpPr>
+          <p:cNvPr id="65" name="TextBox 64">
+            <a:extLst>
+              <a:ext uri="{FF2B5EF4-FFF2-40B4-BE49-F238E27FC236}">
+                <a16:creationId xmlns:a16="http://schemas.microsoft.com/office/drawing/2014/main" id="{46974AA7-0089-8C13-D142-A3DF3400F847}"/>
+              </a:ext>
+            </a:extLst>
+          </p:cNvPr>
+          <p:cNvSpPr txBox="1"/>
+          <p:nvPr/>
+        </p:nvSpPr>
+        <p:spPr>
+          <a:xfrm>
+            <a:off x="5709852" y="4522877"/>
+            <a:ext cx="1173719" cy="369332"/>
+          </a:xfrm>
+          <a:prstGeom prst="rect">
+            <a:avLst/>
+          </a:prstGeom>
+          <a:noFill/>
+        </p:spPr>
+        <p:txBody>
+          <a:bodyPr wrap="none" rtlCol="0">
+            <a:spAutoFit/>
+          </a:bodyPr>
+          <a:lstStyle/>
+          <a:p>
+            <a:r>
+              <a:rPr lang="en-US" altLang="ko-KR" dirty="0"/>
+              <a:t>8,888,888</a:t>
+            </a:r>
+            <a:endParaRPr lang="ko-KR" altLang="en-US" dirty="0"/>
+          </a:p>
+        </p:txBody>
+      </p:sp>
+      <p:cxnSp>
+        <p:nvCxnSpPr>
+          <p:cNvPr id="67" name="직선 연결선 66">
+            <a:extLst>
+              <a:ext uri="{FF2B5EF4-FFF2-40B4-BE49-F238E27FC236}">
+                <a16:creationId xmlns:a16="http://schemas.microsoft.com/office/drawing/2014/main" id="{29AD63C0-5C62-0B42-E46C-9DE86331A230}"/>
+              </a:ext>
+            </a:extLst>
+          </p:cNvPr>
+          <p:cNvCxnSpPr>
+            <a:cxnSpLocks/>
+          </p:cNvCxnSpPr>
+          <p:nvPr/>
+        </p:nvCxnSpPr>
+        <p:spPr>
+          <a:xfrm>
+            <a:off x="5709852" y="4892209"/>
+            <a:ext cx="1161241" cy="0"/>
+          </a:xfrm>
+          <a:prstGeom prst="line">
+            <a:avLst/>
+          </a:prstGeom>
+          <a:ln>
+            <a:solidFill>
+              <a:schemeClr val="tx1">
+                <a:lumMod val="65000"/>
+                <a:lumOff val="35000"/>
+              </a:schemeClr>
+            </a:solidFill>
+          </a:ln>
+        </p:spPr>
+        <p:style>
+          <a:lnRef idx="2">
+            <a:schemeClr val="accent1"/>
+          </a:lnRef>
+          <a:fillRef idx="0">
+            <a:schemeClr val="accent1"/>
+          </a:fillRef>
+          <a:effectRef idx="1">
+            <a:schemeClr val="accent1"/>
+          </a:effectRef>
+          <a:fontRef idx="minor">
+            <a:schemeClr val="tx1"/>
+          </a:fontRef>
+        </p:style>
+      </p:cxnSp>
+      <p:sp>
+        <p:nvSpPr>
+          <p:cNvPr id="69" name="직사각형 68">
+            <a:extLst>
+              <a:ext uri="{FF2B5EF4-FFF2-40B4-BE49-F238E27FC236}">
+                <a16:creationId xmlns:a16="http://schemas.microsoft.com/office/drawing/2014/main" id="{197E3AC1-F81E-1727-7641-7985536CECB1}"/>
+              </a:ext>
+            </a:extLst>
+          </p:cNvPr>
+          <p:cNvSpPr/>
+          <p:nvPr/>
+        </p:nvSpPr>
+        <p:spPr>
+          <a:xfrm>
+            <a:off x="6975595" y="5114224"/>
+            <a:ext cx="609600" cy="609600"/>
+          </a:xfrm>
+          <a:prstGeom prst="rect">
+            <a:avLst/>
+          </a:prstGeom>
+        </p:spPr>
+        <p:style>
+          <a:lnRef idx="2">
+            <a:schemeClr val="accent1">
+              <a:shade val="15000"/>
+            </a:schemeClr>
+          </a:lnRef>
+          <a:fillRef idx="1">
+            <a:schemeClr val="accent1"/>
+          </a:fillRef>
+          <a:effectRef idx="0">
+            <a:schemeClr val="accent1"/>
+          </a:effectRef>
+          <a:fontRef idx="minor">
+            <a:schemeClr val="lt1"/>
+          </a:fontRef>
+        </p:style>
+        <p:txBody>
+          <a:bodyPr rtlCol="0" anchor="ctr"/>
+          <a:lstStyle/>
+          <a:p>
+            <a:pPr algn="ctr"/>
+            <a:endParaRPr lang="ko-KR" altLang="en-US"/>
+          </a:p>
+        </p:txBody>
+      </p:sp>
+      <p:sp>
+        <p:nvSpPr>
+          <p:cNvPr id="70" name="TextBox 69">
+            <a:extLst>
+              <a:ext uri="{FF2B5EF4-FFF2-40B4-BE49-F238E27FC236}">
+                <a16:creationId xmlns:a16="http://schemas.microsoft.com/office/drawing/2014/main" id="{B0E15EEF-FF25-9EDE-8F3B-478E07481006}"/>
+              </a:ext>
+            </a:extLst>
+          </p:cNvPr>
+          <p:cNvSpPr txBox="1"/>
+          <p:nvPr/>
+        </p:nvSpPr>
+        <p:spPr>
+          <a:xfrm>
+            <a:off x="5709852" y="5314752"/>
+            <a:ext cx="1173719" cy="369332"/>
+          </a:xfrm>
+          <a:prstGeom prst="rect">
+            <a:avLst/>
+          </a:prstGeom>
+          <a:noFill/>
+        </p:spPr>
+        <p:txBody>
+          <a:bodyPr wrap="none" rtlCol="0">
+            <a:spAutoFit/>
+          </a:bodyPr>
+          <a:lstStyle/>
+          <a:p>
+            <a:r>
+              <a:rPr lang="en-US" altLang="ko-KR" dirty="0"/>
+              <a:t>8,888,888</a:t>
+            </a:r>
+            <a:endParaRPr lang="ko-KR" altLang="en-US" dirty="0"/>
+          </a:p>
+        </p:txBody>
+      </p:sp>
+      <p:cxnSp>
+        <p:nvCxnSpPr>
+          <p:cNvPr id="72" name="직선 연결선 71">
+            <a:extLst>
+              <a:ext uri="{FF2B5EF4-FFF2-40B4-BE49-F238E27FC236}">
+                <a16:creationId xmlns:a16="http://schemas.microsoft.com/office/drawing/2014/main" id="{D4BA3A8F-AB90-5721-94F4-C9CABB069A1D}"/>
+              </a:ext>
+            </a:extLst>
+          </p:cNvPr>
+          <p:cNvCxnSpPr>
+            <a:cxnSpLocks/>
+          </p:cNvCxnSpPr>
+          <p:nvPr/>
+        </p:nvCxnSpPr>
+        <p:spPr>
+          <a:xfrm>
+            <a:off x="5709852" y="5684084"/>
+            <a:ext cx="1161241" cy="0"/>
+          </a:xfrm>
+          <a:prstGeom prst="line">
+            <a:avLst/>
+          </a:prstGeom>
+          <a:ln>
+            <a:solidFill>
+              <a:schemeClr val="tx1">
+                <a:lumMod val="65000"/>
+                <a:lumOff val="35000"/>
+              </a:schemeClr>
+            </a:solidFill>
+          </a:ln>
+        </p:spPr>
+        <p:style>
+          <a:lnRef idx="2">
+            <a:schemeClr val="accent1"/>
+          </a:lnRef>
+          <a:fillRef idx="0">
+            <a:schemeClr val="accent1"/>
+          </a:fillRef>
+          <a:effectRef idx="1">
+            <a:schemeClr val="accent1"/>
+          </a:effectRef>
+          <a:fontRef idx="minor">
+            <a:schemeClr val="tx1"/>
+          </a:fontRef>
+        </p:style>
+      </p:cxnSp>
+      <p:sp>
+        <p:nvSpPr>
+          <p:cNvPr id="74" name="직사각형 73">
+            <a:extLst>
+              <a:ext uri="{FF2B5EF4-FFF2-40B4-BE49-F238E27FC236}">
+                <a16:creationId xmlns:a16="http://schemas.microsoft.com/office/drawing/2014/main" id="{387BFDB0-F690-10DC-FE58-57FA1C74C4EC}"/>
+              </a:ext>
+            </a:extLst>
+          </p:cNvPr>
+          <p:cNvSpPr/>
+          <p:nvPr/>
+        </p:nvSpPr>
+        <p:spPr>
+          <a:xfrm>
+            <a:off x="6975595" y="5883546"/>
+            <a:ext cx="609600" cy="609600"/>
+          </a:xfrm>
+          <a:prstGeom prst="rect">
+            <a:avLst/>
+          </a:prstGeom>
+        </p:spPr>
+        <p:style>
+          <a:lnRef idx="2">
+            <a:schemeClr val="accent1">
+              <a:shade val="15000"/>
+            </a:schemeClr>
+          </a:lnRef>
+          <a:fillRef idx="1">
+            <a:schemeClr val="accent1"/>
+          </a:fillRef>
+          <a:effectRef idx="0">
+            <a:schemeClr val="accent1"/>
+          </a:effectRef>
+          <a:fontRef idx="minor">
+            <a:schemeClr val="lt1"/>
+          </a:fontRef>
+        </p:style>
+        <p:txBody>
+          <a:bodyPr rtlCol="0" anchor="ctr"/>
+          <a:lstStyle/>
+          <a:p>
+            <a:pPr algn="ctr"/>
+            <a:endParaRPr lang="ko-KR" altLang="en-US"/>
+          </a:p>
+        </p:txBody>
+      </p:sp>
+      <p:sp>
+        <p:nvSpPr>
+          <p:cNvPr id="75" name="TextBox 74">
+            <a:extLst>
+              <a:ext uri="{FF2B5EF4-FFF2-40B4-BE49-F238E27FC236}">
+                <a16:creationId xmlns:a16="http://schemas.microsoft.com/office/drawing/2014/main" id="{0489DC3F-35A3-8BD7-B860-77F69FABE3DC}"/>
+              </a:ext>
+            </a:extLst>
+          </p:cNvPr>
+          <p:cNvSpPr txBox="1"/>
+          <p:nvPr/>
+        </p:nvSpPr>
+        <p:spPr>
+          <a:xfrm>
+            <a:off x="5709852" y="6084074"/>
+            <a:ext cx="1173719" cy="369332"/>
+          </a:xfrm>
+          <a:prstGeom prst="rect">
+            <a:avLst/>
+          </a:prstGeom>
+          <a:noFill/>
+        </p:spPr>
+        <p:txBody>
+          <a:bodyPr wrap="none" rtlCol="0">
+            <a:spAutoFit/>
+          </a:bodyPr>
+          <a:lstStyle/>
+          <a:p>
+            <a:r>
+              <a:rPr lang="en-US" altLang="ko-KR" dirty="0"/>
+              <a:t>8,888,888</a:t>
+            </a:r>
+            <a:endParaRPr lang="ko-KR" altLang="en-US" dirty="0"/>
+          </a:p>
+        </p:txBody>
+      </p:sp>
+      <p:cxnSp>
+        <p:nvCxnSpPr>
+          <p:cNvPr id="77" name="직선 연결선 76">
+            <a:extLst>
+              <a:ext uri="{FF2B5EF4-FFF2-40B4-BE49-F238E27FC236}">
+                <a16:creationId xmlns:a16="http://schemas.microsoft.com/office/drawing/2014/main" id="{465B8B14-4910-22B5-225D-63B3AAC1B258}"/>
+              </a:ext>
+            </a:extLst>
+          </p:cNvPr>
+          <p:cNvCxnSpPr>
+            <a:cxnSpLocks/>
+          </p:cNvCxnSpPr>
+          <p:nvPr/>
+        </p:nvCxnSpPr>
+        <p:spPr>
+          <a:xfrm>
+            <a:off x="5709852" y="6453406"/>
+            <a:ext cx="1161241" cy="0"/>
+          </a:xfrm>
+          <a:prstGeom prst="line">
+            <a:avLst/>
+          </a:prstGeom>
+          <a:ln>
+            <a:solidFill>
+              <a:schemeClr val="tx1">
+                <a:lumMod val="65000"/>
+                <a:lumOff val="35000"/>
+              </a:schemeClr>
+            </a:solidFill>
+          </a:ln>
+        </p:spPr>
+        <p:style>
+          <a:lnRef idx="2">
+            <a:schemeClr val="accent1"/>
+          </a:lnRef>
+          <a:fillRef idx="0">
+            <a:schemeClr val="accent1"/>
+          </a:fillRef>
+          <a:effectRef idx="1">
+            <a:schemeClr val="accent1"/>
+          </a:effectRef>
+          <a:fontRef idx="minor">
+            <a:schemeClr val="tx1"/>
+          </a:fontRef>
+        </p:style>
+      </p:cxnSp>
     </p:spTree>
     <p:extLst>
       <p:ext uri="{BB962C8B-B14F-4D97-AF65-F5344CB8AC3E}">

</xml_diff>